<commit_message>
edited header banner and picture
</commit_message>
<xml_diff>
--- a/images/header.pptx
+++ b/images/header.pptx
@@ -104,7 +104,49 @@
       </a:defRPr>
     </a:lvl9pPr>
   </p:defaultTextStyle>
+  <p:extLst>
+    <p:ext uri="{EFAFB233-063F-42B5-8137-9DF3F51BA10A}">
+      <p15:sldGuideLst xmlns:p15="http://schemas.microsoft.com/office/powerpoint/2012/main"/>
+    </p:ext>
+  </p:extLst>
 </p:presentation>
+</file>
+
+<file path=ppt/revisionInfo.xml><?xml version="1.0" encoding="utf-8"?>
+<p1510:revInfo xmlns:a="http://schemas.openxmlformats.org/drawingml/2006/main" xmlns:r="http://schemas.openxmlformats.org/officeDocument/2006/relationships" xmlns:p1510="http://schemas.microsoft.com/office/powerpoint/2015/10/main">
+  <p1510:revLst>
+    <p1510:client id="{52F1B614-AF56-4096-9652-87A4971CC591}" v="2" dt="2019-12-03T08:28:06.455"/>
+  </p1510:revLst>
+</p1510:revInfo>
+</file>
+
+<file path=ppt/changesInfos/changesInfo1.xml><?xml version="1.0" encoding="utf-8"?>
+<pc:chgInfo xmlns:a="http://schemas.openxmlformats.org/drawingml/2006/main" xmlns:r="http://schemas.openxmlformats.org/officeDocument/2006/relationships" xmlns:ac="http://schemas.microsoft.com/office/drawing/2013/main/command" xmlns:pc="http://schemas.microsoft.com/office/powerpoint/2013/main/command">
+  <pc:docChgLst>
+    <pc:chgData name="坂本 嵩" userId="54380f1e-e920-4bf3-aacc-35b07fd0251e" providerId="ADAL" clId="{52F1B614-AF56-4096-9652-87A4971CC591}"/>
+    <pc:docChg chg="undo custSel modSld">
+      <pc:chgData name="坂本 嵩" userId="54380f1e-e920-4bf3-aacc-35b07fd0251e" providerId="ADAL" clId="{52F1B614-AF56-4096-9652-87A4971CC591}" dt="2019-12-03T08:28:06.455" v="3" actId="207"/>
+      <pc:docMkLst>
+        <pc:docMk/>
+      </pc:docMkLst>
+      <pc:sldChg chg="modSp">
+        <pc:chgData name="坂本 嵩" userId="54380f1e-e920-4bf3-aacc-35b07fd0251e" providerId="ADAL" clId="{52F1B614-AF56-4096-9652-87A4971CC591}" dt="2019-12-03T08:28:06.455" v="3" actId="207"/>
+        <pc:sldMkLst>
+          <pc:docMk/>
+          <pc:sldMk cId="167324151" sldId="256"/>
+        </pc:sldMkLst>
+        <pc:spChg chg="mod">
+          <ac:chgData name="坂本 嵩" userId="54380f1e-e920-4bf3-aacc-35b07fd0251e" providerId="ADAL" clId="{52F1B614-AF56-4096-9652-87A4971CC591}" dt="2019-12-03T08:28:06.455" v="3" actId="207"/>
+          <ac:spMkLst>
+            <pc:docMk/>
+            <pc:sldMk cId="167324151" sldId="256"/>
+            <ac:spMk id="6" creationId="{F25BA27D-155A-460D-B981-3A15DB2BF84F}"/>
+          </ac:spMkLst>
+        </pc:spChg>
+      </pc:sldChg>
+    </pc:docChg>
+  </pc:docChgLst>
+</pc:chgInfo>
 </file>
 
 <file path=ppt/slideLayouts/slideLayout1.xml><?xml version="1.0" encoding="utf-8"?>
@@ -254,7 +296,7 @@
           <a:p>
             <a:fld id="{2BE1E8B6-2518-40B4-9419-86015BC71C7C}" type="datetimeFigureOut">
               <a:rPr kumimoji="1" lang="ja-JP" altLang="en-US" smtClean="0"/>
-              <a:t>2018/10/31</a:t>
+              <a:t>2019/12/3</a:t>
             </a:fld>
             <a:endParaRPr kumimoji="1" lang="ja-JP" altLang="en-US"/>
           </a:p>
@@ -484,7 +526,7 @@
           <a:p>
             <a:fld id="{2BE1E8B6-2518-40B4-9419-86015BC71C7C}" type="datetimeFigureOut">
               <a:rPr kumimoji="1" lang="ja-JP" altLang="en-US" smtClean="0"/>
-              <a:t>2018/10/31</a:t>
+              <a:t>2019/12/3</a:t>
             </a:fld>
             <a:endParaRPr kumimoji="1" lang="ja-JP" altLang="en-US"/>
           </a:p>
@@ -724,7 +766,7 @@
           <a:p>
             <a:fld id="{2BE1E8B6-2518-40B4-9419-86015BC71C7C}" type="datetimeFigureOut">
               <a:rPr kumimoji="1" lang="ja-JP" altLang="en-US" smtClean="0"/>
-              <a:t>2018/10/31</a:t>
+              <a:t>2019/12/3</a:t>
             </a:fld>
             <a:endParaRPr kumimoji="1" lang="ja-JP" altLang="en-US"/>
           </a:p>
@@ -954,7 +996,7 @@
           <a:p>
             <a:fld id="{2BE1E8B6-2518-40B4-9419-86015BC71C7C}" type="datetimeFigureOut">
               <a:rPr kumimoji="1" lang="ja-JP" altLang="en-US" smtClean="0"/>
-              <a:t>2018/10/31</a:t>
+              <a:t>2019/12/3</a:t>
             </a:fld>
             <a:endParaRPr kumimoji="1" lang="ja-JP" altLang="en-US"/>
           </a:p>
@@ -1229,7 +1271,7 @@
           <a:p>
             <a:fld id="{2BE1E8B6-2518-40B4-9419-86015BC71C7C}" type="datetimeFigureOut">
               <a:rPr kumimoji="1" lang="ja-JP" altLang="en-US" smtClean="0"/>
-              <a:t>2018/10/31</a:t>
+              <a:t>2019/12/3</a:t>
             </a:fld>
             <a:endParaRPr kumimoji="1" lang="ja-JP" altLang="en-US"/>
           </a:p>
@@ -1558,7 +1600,7 @@
           <a:p>
             <a:fld id="{2BE1E8B6-2518-40B4-9419-86015BC71C7C}" type="datetimeFigureOut">
               <a:rPr kumimoji="1" lang="ja-JP" altLang="en-US" smtClean="0"/>
-              <a:t>2018/10/31</a:t>
+              <a:t>2019/12/3</a:t>
             </a:fld>
             <a:endParaRPr kumimoji="1" lang="ja-JP" altLang="en-US"/>
           </a:p>
@@ -2034,7 +2076,7 @@
           <a:p>
             <a:fld id="{2BE1E8B6-2518-40B4-9419-86015BC71C7C}" type="datetimeFigureOut">
               <a:rPr kumimoji="1" lang="ja-JP" altLang="en-US" smtClean="0"/>
-              <a:t>2018/10/31</a:t>
+              <a:t>2019/12/3</a:t>
             </a:fld>
             <a:endParaRPr kumimoji="1" lang="ja-JP" altLang="en-US"/>
           </a:p>
@@ -2175,7 +2217,7 @@
           <a:p>
             <a:fld id="{2BE1E8B6-2518-40B4-9419-86015BC71C7C}" type="datetimeFigureOut">
               <a:rPr kumimoji="1" lang="ja-JP" altLang="en-US" smtClean="0"/>
-              <a:t>2018/10/31</a:t>
+              <a:t>2019/12/3</a:t>
             </a:fld>
             <a:endParaRPr kumimoji="1" lang="ja-JP" altLang="en-US"/>
           </a:p>
@@ -2288,7 +2330,7 @@
           <a:p>
             <a:fld id="{2BE1E8B6-2518-40B4-9419-86015BC71C7C}" type="datetimeFigureOut">
               <a:rPr kumimoji="1" lang="ja-JP" altLang="en-US" smtClean="0"/>
-              <a:t>2018/10/31</a:t>
+              <a:t>2019/12/3</a:t>
             </a:fld>
             <a:endParaRPr kumimoji="1" lang="ja-JP" altLang="en-US"/>
           </a:p>
@@ -2631,7 +2673,7 @@
           <a:p>
             <a:fld id="{2BE1E8B6-2518-40B4-9419-86015BC71C7C}" type="datetimeFigureOut">
               <a:rPr kumimoji="1" lang="ja-JP" altLang="en-US" smtClean="0"/>
-              <a:t>2018/10/31</a:t>
+              <a:t>2019/12/3</a:t>
             </a:fld>
             <a:endParaRPr kumimoji="1" lang="ja-JP" altLang="en-US"/>
           </a:p>
@@ -2919,7 +2961,7 @@
           <a:p>
             <a:fld id="{2BE1E8B6-2518-40B4-9419-86015BC71C7C}" type="datetimeFigureOut">
               <a:rPr kumimoji="1" lang="ja-JP" altLang="en-US" smtClean="0"/>
-              <a:t>2018/10/31</a:t>
+              <a:t>2019/12/3</a:t>
             </a:fld>
             <a:endParaRPr kumimoji="1" lang="ja-JP" altLang="en-US"/>
           </a:p>
@@ -3192,7 +3234,7 @@
           <a:p>
             <a:fld id="{2BE1E8B6-2518-40B4-9419-86015BC71C7C}" type="datetimeFigureOut">
               <a:rPr kumimoji="1" lang="ja-JP" altLang="en-US" smtClean="0"/>
-              <a:t>2018/10/31</a:t>
+              <a:t>2019/12/3</a:t>
             </a:fld>
             <a:endParaRPr kumimoji="1" lang="ja-JP" altLang="en-US"/>
           </a:p>
@@ -3727,7 +3769,7 @@
           </a:prstGeom>
           <a:solidFill>
             <a:schemeClr val="tx1">
-              <a:alpha val="20000"/>
+              <a:alpha val="40000"/>
             </a:schemeClr>
           </a:solidFill>
           <a:ln>

</xml_diff>